<commit_message>
Session 3 morning update
</commit_message>
<xml_diff>
--- a/Oemof_Workshop_06_Kickoff_Wednesday.pptx
+++ b/Oemof_Workshop_06_Kickoff_Wednesday.pptx
@@ -212,7 +212,7 @@
           <a:p>
             <a:fld id="{6BD11D3B-DADA-9042-8997-28ACE677BFD3}" type="datetimeFigureOut">
               <a:rPr lang="de-DE" smtClean="0"/>
-              <a:t>15.09.2019</a:t>
+              <a:t>18.09.2019</a:t>
             </a:fld>
             <a:endParaRPr lang="de-DE"/>
           </a:p>
@@ -10535,7 +10535,7 @@
           <p:nvPr>
             <p:extLst>
               <p:ext uri="{D42A27DB-BD31-4B8C-83A1-F6EECF244321}">
-                <p14:modId xmlns:p14="http://schemas.microsoft.com/office/powerpoint/2010/main" val="1973989110"/>
+                <p14:modId xmlns:p14="http://schemas.microsoft.com/office/powerpoint/2010/main" val="2581723773"/>
               </p:ext>
             </p:extLst>
           </p:nvPr>
@@ -11123,7 +11123,7 @@
                       </a:r>
                       <a:r>
                         <a:rPr lang="de-DE" baseline="0" dirty="0" err="1" smtClean="0"/>
-                        <a:t>constrain</a:t>
+                        <a:t>constrains</a:t>
                       </a:r>
                       <a:endParaRPr lang="de-DE" dirty="0"/>
                     </a:p>

</xml_diff>